<commit_message>
Added Remove Customer Sequence Diagram
</commit_message>
<xml_diff>
--- a/Diagrams and Charts/Sequence Charts.pptx
+++ b/Diagrams and Charts/Sequence Charts.pptx
@@ -11474,97 +11474,6 @@
           </a:p>
         </p:txBody>
       </p:sp>
-      <p:sp>
-        <p:nvSpPr>
-          <p:cNvPr id="6" name="Rectangle 5">
-            <a:extLst>
-              <a:ext uri="{FF2B5EF4-FFF2-40B4-BE49-F238E27FC236}">
-                <a16:creationId xmlns:a16="http://schemas.microsoft.com/office/drawing/2014/main" id="{5993E7F0-A172-4838-883D-6CEFEA31C010}"/>
-              </a:ext>
-            </a:extLst>
-          </p:cNvPr>
-          <p:cNvSpPr/>
-          <p:nvPr/>
-        </p:nvSpPr>
-        <p:spPr>
-          <a:xfrm>
-            <a:off x="2001329" y="1114021"/>
-            <a:ext cx="169057" cy="4913656"/>
-          </a:xfrm>
-          <a:prstGeom prst="rect">
-            <a:avLst/>
-          </a:prstGeom>
-          <a:solidFill>
-            <a:schemeClr val="bg2"/>
-          </a:solidFill>
-          <a:ln>
-            <a:solidFill>
-              <a:schemeClr val="tx1"/>
-            </a:solidFill>
-          </a:ln>
-        </p:spPr>
-        <p:style>
-          <a:lnRef idx="2">
-            <a:schemeClr val="accent1">
-              <a:shade val="50000"/>
-            </a:schemeClr>
-          </a:lnRef>
-          <a:fillRef idx="1">
-            <a:schemeClr val="accent1"/>
-          </a:fillRef>
-          <a:effectRef idx="0">
-            <a:schemeClr val="accent1"/>
-          </a:effectRef>
-          <a:fontRef idx="minor">
-            <a:schemeClr val="lt1"/>
-          </a:fontRef>
-        </p:style>
-        <p:txBody>
-          <a:bodyPr rtlCol="0" anchor="ctr"/>
-          <a:lstStyle/>
-          <a:p>
-            <a:pPr algn="ctr"/>
-            <a:endParaRPr lang="en-US"/>
-          </a:p>
-        </p:txBody>
-      </p:sp>
-      <p:sp>
-        <p:nvSpPr>
-          <p:cNvPr id="7" name="TextBox 6">
-            <a:extLst>
-              <a:ext uri="{FF2B5EF4-FFF2-40B4-BE49-F238E27FC236}">
-                <a16:creationId xmlns:a16="http://schemas.microsoft.com/office/drawing/2014/main" id="{8D400405-8429-45D0-A6D6-38BE802C9D65}"/>
-              </a:ext>
-            </a:extLst>
-          </p:cNvPr>
-          <p:cNvSpPr txBox="1"/>
-          <p:nvPr/>
-        </p:nvSpPr>
-        <p:spPr>
-          <a:xfrm>
-            <a:off x="1389993" y="783735"/>
-            <a:ext cx="1391728" cy="307777"/>
-          </a:xfrm>
-          <a:prstGeom prst="rect">
-            <a:avLst/>
-          </a:prstGeom>
-          <a:noFill/>
-        </p:spPr>
-        <p:txBody>
-          <a:bodyPr wrap="none" rtlCol="0">
-            <a:spAutoFit/>
-          </a:bodyPr>
-          <a:lstStyle/>
-          <a:p>
-            <a:r>
-              <a:rPr lang="en-US" sz="1400" u="sng" dirty="0">
-                <a:latin typeface="Georgia" panose="02040502050405020303" pitchFamily="18" charset="0"/>
-              </a:rPr>
-              <a:t>Command GUI</a:t>
-            </a:r>
-          </a:p>
-        </p:txBody>
-      </p:sp>
       <p:pic>
         <p:nvPicPr>
           <p:cNvPr id="9" name="Graphic 8" descr="User">
@@ -11641,950 +11550,42 @@
           </a:p>
         </p:txBody>
       </p:sp>
-      <p:cxnSp>
-        <p:nvCxnSpPr>
-          <p:cNvPr id="13" name="Straight Arrow Connector 12">
-            <a:extLst>
-              <a:ext uri="{FF2B5EF4-FFF2-40B4-BE49-F238E27FC236}">
-                <a16:creationId xmlns:a16="http://schemas.microsoft.com/office/drawing/2014/main" id="{C92A00A1-D5F3-47EB-A5AB-07025FE787B1}"/>
-              </a:ext>
-            </a:extLst>
-          </p:cNvPr>
-          <p:cNvCxnSpPr>
-            <a:cxnSpLocks/>
-          </p:cNvCxnSpPr>
-          <p:nvPr/>
-        </p:nvCxnSpPr>
-        <p:spPr>
-          <a:xfrm>
-            <a:off x="940676" y="1334813"/>
-            <a:ext cx="1060653" cy="0"/>
-          </a:xfrm>
-          <a:prstGeom prst="straightConnector1">
-            <a:avLst/>
-          </a:prstGeom>
-          <a:ln>
-            <a:headEnd type="none" w="med" len="med"/>
-            <a:tailEnd type="arrow" w="med" len="med"/>
-          </a:ln>
-        </p:spPr>
-        <p:style>
-          <a:lnRef idx="3">
-            <a:schemeClr val="dk1"/>
-          </a:lnRef>
-          <a:fillRef idx="0">
-            <a:schemeClr val="dk1"/>
-          </a:fillRef>
-          <a:effectRef idx="2">
-            <a:schemeClr val="dk1"/>
-          </a:effectRef>
-          <a:fontRef idx="minor">
-            <a:schemeClr val="tx1"/>
-          </a:fontRef>
-        </p:style>
-      </p:cxnSp>
-      <p:sp>
-        <p:nvSpPr>
-          <p:cNvPr id="16" name="Rectangle 15">
-            <a:extLst>
-              <a:ext uri="{FF2B5EF4-FFF2-40B4-BE49-F238E27FC236}">
-                <a16:creationId xmlns:a16="http://schemas.microsoft.com/office/drawing/2014/main" id="{0285C4BD-12F1-4D93-81B0-4B81C5DE0ACF}"/>
-              </a:ext>
-            </a:extLst>
-          </p:cNvPr>
-          <p:cNvSpPr/>
-          <p:nvPr/>
-        </p:nvSpPr>
-        <p:spPr>
-          <a:xfrm>
-            <a:off x="4544870" y="1283680"/>
-            <a:ext cx="169057" cy="4391855"/>
-          </a:xfrm>
-          <a:prstGeom prst="rect">
-            <a:avLst/>
-          </a:prstGeom>
-          <a:solidFill>
-            <a:schemeClr val="bg2"/>
-          </a:solidFill>
-          <a:ln>
-            <a:solidFill>
-              <a:schemeClr val="tx1"/>
-            </a:solidFill>
-          </a:ln>
-        </p:spPr>
-        <p:style>
-          <a:lnRef idx="2">
-            <a:schemeClr val="accent1">
-              <a:shade val="50000"/>
-            </a:schemeClr>
-          </a:lnRef>
-          <a:fillRef idx="1">
-            <a:schemeClr val="accent1"/>
-          </a:fillRef>
-          <a:effectRef idx="0">
-            <a:schemeClr val="accent1"/>
-          </a:effectRef>
-          <a:fontRef idx="minor">
-            <a:schemeClr val="lt1"/>
-          </a:fontRef>
-        </p:style>
-        <p:txBody>
-          <a:bodyPr rtlCol="0" anchor="ctr"/>
-          <a:lstStyle/>
-          <a:p>
-            <a:pPr algn="ctr"/>
-            <a:endParaRPr lang="en-US"/>
-          </a:p>
-        </p:txBody>
-      </p:sp>
-      <p:sp>
-        <p:nvSpPr>
-          <p:cNvPr id="17" name="TextBox 16">
-            <a:extLst>
-              <a:ext uri="{FF2B5EF4-FFF2-40B4-BE49-F238E27FC236}">
-                <a16:creationId xmlns:a16="http://schemas.microsoft.com/office/drawing/2014/main" id="{5F14A1DD-3841-44CD-81BB-FC50BB190866}"/>
-              </a:ext>
-            </a:extLst>
-          </p:cNvPr>
-          <p:cNvSpPr txBox="1"/>
-          <p:nvPr/>
-        </p:nvSpPr>
-        <p:spPr>
-          <a:xfrm>
-            <a:off x="4230088" y="780958"/>
-            <a:ext cx="798617" cy="307777"/>
-          </a:xfrm>
-          <a:prstGeom prst="rect">
-            <a:avLst/>
-          </a:prstGeom>
-          <a:noFill/>
-        </p:spPr>
-        <p:txBody>
-          <a:bodyPr wrap="none" rtlCol="0">
-            <a:spAutoFit/>
-          </a:bodyPr>
-          <a:lstStyle/>
-          <a:p>
-            <a:r>
-              <a:rPr lang="en-US" sz="1400" u="sng" dirty="0">
-                <a:latin typeface="Georgia" panose="02040502050405020303" pitchFamily="18" charset="0"/>
-              </a:rPr>
-              <a:t>Theater</a:t>
-            </a:r>
-          </a:p>
-        </p:txBody>
-      </p:sp>
-      <p:cxnSp>
-        <p:nvCxnSpPr>
-          <p:cNvPr id="19" name="Straight Connector 18">
-            <a:extLst>
-              <a:ext uri="{FF2B5EF4-FFF2-40B4-BE49-F238E27FC236}">
-                <a16:creationId xmlns:a16="http://schemas.microsoft.com/office/drawing/2014/main" id="{3145678D-8CB4-4933-BC4C-B105C5495678}"/>
-              </a:ext>
-            </a:extLst>
-          </p:cNvPr>
-          <p:cNvCxnSpPr/>
-          <p:nvPr/>
-        </p:nvCxnSpPr>
-        <p:spPr>
-          <a:xfrm>
-            <a:off x="2065283" y="6027677"/>
-            <a:ext cx="0" cy="294295"/>
-          </a:xfrm>
-          <a:prstGeom prst="line">
-            <a:avLst/>
-          </a:prstGeom>
-          <a:ln w="9525" cap="flat" cmpd="sng" algn="ctr">
-            <a:solidFill>
-              <a:schemeClr val="dk1"/>
-            </a:solidFill>
-            <a:prstDash val="dash"/>
-            <a:round/>
-            <a:headEnd type="none" w="med" len="med"/>
-            <a:tailEnd type="none" w="med" len="med"/>
-          </a:ln>
-        </p:spPr>
-        <p:style>
-          <a:lnRef idx="0">
-            <a:scrgbClr r="0" g="0" b="0"/>
-          </a:lnRef>
-          <a:fillRef idx="0">
-            <a:scrgbClr r="0" g="0" b="0"/>
-          </a:fillRef>
-          <a:effectRef idx="0">
-            <a:scrgbClr r="0" g="0" b="0"/>
-          </a:effectRef>
-          <a:fontRef idx="minor">
-            <a:schemeClr val="tx1"/>
-          </a:fontRef>
-        </p:style>
-      </p:cxnSp>
-      <p:cxnSp>
-        <p:nvCxnSpPr>
-          <p:cNvPr id="20" name="Straight Connector 19">
-            <a:extLst>
-              <a:ext uri="{FF2B5EF4-FFF2-40B4-BE49-F238E27FC236}">
-                <a16:creationId xmlns:a16="http://schemas.microsoft.com/office/drawing/2014/main" id="{093D5B23-CD8E-4B7F-9953-8B4E721B9BC0}"/>
-              </a:ext>
-            </a:extLst>
-          </p:cNvPr>
-          <p:cNvCxnSpPr>
-            <a:cxnSpLocks/>
-          </p:cNvCxnSpPr>
-          <p:nvPr/>
-        </p:nvCxnSpPr>
-        <p:spPr>
-          <a:xfrm>
-            <a:off x="4619333" y="5675535"/>
-            <a:ext cx="0" cy="646437"/>
-          </a:xfrm>
-          <a:prstGeom prst="line">
-            <a:avLst/>
-          </a:prstGeom>
-          <a:ln w="9525" cap="flat" cmpd="sng" algn="ctr">
-            <a:solidFill>
-              <a:schemeClr val="dk1"/>
-            </a:solidFill>
-            <a:prstDash val="dash"/>
-            <a:round/>
-            <a:headEnd type="none" w="med" len="med"/>
-            <a:tailEnd type="none" w="med" len="med"/>
-          </a:ln>
-        </p:spPr>
-        <p:style>
-          <a:lnRef idx="0">
-            <a:scrgbClr r="0" g="0" b="0"/>
-          </a:lnRef>
-          <a:fillRef idx="0">
-            <a:scrgbClr r="0" g="0" b="0"/>
-          </a:fillRef>
-          <a:effectRef idx="0">
-            <a:scrgbClr r="0" g="0" b="0"/>
-          </a:effectRef>
-          <a:fontRef idx="minor">
-            <a:schemeClr val="tx1"/>
-          </a:fontRef>
-        </p:style>
-      </p:cxnSp>
-      <p:sp>
-        <p:nvSpPr>
-          <p:cNvPr id="2" name="TextBox 1">
-            <a:extLst>
-              <a:ext uri="{FF2B5EF4-FFF2-40B4-BE49-F238E27FC236}">
-                <a16:creationId xmlns:a16="http://schemas.microsoft.com/office/drawing/2014/main" id="{83ADB76A-5987-4181-B4F4-D057D6E6076C}"/>
-              </a:ext>
-            </a:extLst>
-          </p:cNvPr>
-          <p:cNvSpPr txBox="1"/>
-          <p:nvPr/>
-        </p:nvSpPr>
-        <p:spPr>
-          <a:xfrm>
-            <a:off x="330515" y="1040100"/>
-            <a:ext cx="1683474" cy="307777"/>
-          </a:xfrm>
-          <a:prstGeom prst="rect">
-            <a:avLst/>
-          </a:prstGeom>
-          <a:noFill/>
-        </p:spPr>
-        <p:txBody>
-          <a:bodyPr wrap="none" rtlCol="0">
-            <a:spAutoFit/>
-          </a:bodyPr>
-          <a:lstStyle/>
-          <a:p>
-            <a:r>
-              <a:rPr lang="en-US" sz="1400" dirty="0" err="1">
-                <a:latin typeface="Georgia" panose="02040502050405020303" pitchFamily="18" charset="0"/>
-              </a:rPr>
-              <a:t>removeCustomer</a:t>
-            </a:r>
-            <a:r>
-              <a:rPr lang="en-US" sz="1400" dirty="0">
-                <a:latin typeface="Georgia" panose="02040502050405020303" pitchFamily="18" charset="0"/>
-              </a:rPr>
-              <a:t>()</a:t>
-            </a:r>
-          </a:p>
-        </p:txBody>
-      </p:sp>
-      <p:cxnSp>
-        <p:nvCxnSpPr>
-          <p:cNvPr id="8" name="Straight Arrow Connector 7">
-            <a:extLst>
-              <a:ext uri="{FF2B5EF4-FFF2-40B4-BE49-F238E27FC236}">
-                <a16:creationId xmlns:a16="http://schemas.microsoft.com/office/drawing/2014/main" id="{654816B3-ADA2-45CA-AA92-3CEADAC81496}"/>
-              </a:ext>
-            </a:extLst>
-          </p:cNvPr>
-          <p:cNvCxnSpPr/>
-          <p:nvPr/>
-        </p:nvCxnSpPr>
-        <p:spPr>
-          <a:xfrm flipH="1">
-            <a:off x="1192696" y="1762318"/>
-            <a:ext cx="808633" cy="0"/>
-          </a:xfrm>
-          <a:prstGeom prst="straightConnector1">
-            <a:avLst/>
-          </a:prstGeom>
-          <a:ln>
-            <a:tailEnd type="triangle"/>
-          </a:ln>
-        </p:spPr>
-        <p:style>
-          <a:lnRef idx="3">
-            <a:schemeClr val="dk1"/>
-          </a:lnRef>
-          <a:fillRef idx="0">
-            <a:schemeClr val="dk1"/>
-          </a:fillRef>
-          <a:effectRef idx="2">
-            <a:schemeClr val="dk1"/>
-          </a:effectRef>
-          <a:fontRef idx="minor">
-            <a:schemeClr val="tx1"/>
-          </a:fontRef>
-        </p:style>
-      </p:cxnSp>
-      <p:sp>
-        <p:nvSpPr>
-          <p:cNvPr id="11" name="TextBox 10">
-            <a:extLst>
-              <a:ext uri="{FF2B5EF4-FFF2-40B4-BE49-F238E27FC236}">
-                <a16:creationId xmlns:a16="http://schemas.microsoft.com/office/drawing/2014/main" id="{86A5E434-3B58-4D8B-959C-D4A1C0D86BD9}"/>
-              </a:ext>
-            </a:extLst>
-          </p:cNvPr>
-          <p:cNvSpPr txBox="1"/>
-          <p:nvPr/>
-        </p:nvSpPr>
-        <p:spPr>
-          <a:xfrm>
-            <a:off x="772935" y="1458236"/>
-            <a:ext cx="1194558" cy="307777"/>
-          </a:xfrm>
-          <a:prstGeom prst="rect">
-            <a:avLst/>
-          </a:prstGeom>
-          <a:noFill/>
-        </p:spPr>
-        <p:txBody>
-          <a:bodyPr wrap="none" rtlCol="0">
-            <a:spAutoFit/>
-          </a:bodyPr>
-          <a:lstStyle/>
-          <a:p>
-            <a:r>
-              <a:rPr lang="en-US" sz="1400" dirty="0">
-                <a:latin typeface="Georgia" panose="02040502050405020303" pitchFamily="18" charset="0"/>
-              </a:rPr>
-              <a:t>Data request</a:t>
-            </a:r>
-          </a:p>
-        </p:txBody>
-      </p:sp>
-      <p:cxnSp>
-        <p:nvCxnSpPr>
-          <p:cNvPr id="18" name="Straight Arrow Connector 17">
-            <a:extLst>
-              <a:ext uri="{FF2B5EF4-FFF2-40B4-BE49-F238E27FC236}">
-                <a16:creationId xmlns:a16="http://schemas.microsoft.com/office/drawing/2014/main" id="{EAFACEE2-E314-4550-BBFD-230E356FE298}"/>
-              </a:ext>
-            </a:extLst>
-          </p:cNvPr>
-          <p:cNvCxnSpPr>
-            <a:cxnSpLocks/>
-          </p:cNvCxnSpPr>
-          <p:nvPr/>
-        </p:nvCxnSpPr>
-        <p:spPr>
-          <a:xfrm>
-            <a:off x="1340177" y="2232592"/>
-            <a:ext cx="661152" cy="5012"/>
-          </a:xfrm>
-          <a:prstGeom prst="straightConnector1">
-            <a:avLst/>
-          </a:prstGeom>
-          <a:ln>
-            <a:tailEnd type="triangle"/>
-          </a:ln>
-        </p:spPr>
-        <p:style>
-          <a:lnRef idx="3">
-            <a:schemeClr val="dk1"/>
-          </a:lnRef>
-          <a:fillRef idx="0">
-            <a:schemeClr val="dk1"/>
-          </a:fillRef>
-          <a:effectRef idx="2">
-            <a:schemeClr val="dk1"/>
-          </a:effectRef>
-          <a:fontRef idx="minor">
-            <a:schemeClr val="tx1"/>
-          </a:fontRef>
-        </p:style>
-      </p:cxnSp>
-      <p:sp>
-        <p:nvSpPr>
-          <p:cNvPr id="21" name="TextBox 20">
-            <a:extLst>
-              <a:ext uri="{FF2B5EF4-FFF2-40B4-BE49-F238E27FC236}">
-                <a16:creationId xmlns:a16="http://schemas.microsoft.com/office/drawing/2014/main" id="{0C46E3DB-9E01-4AA1-A621-D15237CED1DF}"/>
-              </a:ext>
-            </a:extLst>
-          </p:cNvPr>
-          <p:cNvSpPr txBox="1"/>
-          <p:nvPr/>
-        </p:nvSpPr>
-        <p:spPr>
-          <a:xfrm>
-            <a:off x="832406" y="1920671"/>
-            <a:ext cx="1096775" cy="307777"/>
-          </a:xfrm>
-          <a:prstGeom prst="rect">
-            <a:avLst/>
-          </a:prstGeom>
-          <a:noFill/>
-        </p:spPr>
-        <p:txBody>
-          <a:bodyPr wrap="none" rtlCol="0">
-            <a:spAutoFit/>
-          </a:bodyPr>
-          <a:lstStyle/>
-          <a:p>
-            <a:r>
-              <a:rPr lang="en-US" sz="1400" dirty="0" err="1">
-                <a:latin typeface="Georgia" panose="02040502050405020303" pitchFamily="18" charset="0"/>
-              </a:rPr>
-              <a:t>customerId</a:t>
-            </a:r>
-            <a:endParaRPr lang="en-US" sz="1400" dirty="0">
-              <a:latin typeface="Georgia" panose="02040502050405020303" pitchFamily="18" charset="0"/>
-            </a:endParaRPr>
-          </a:p>
-        </p:txBody>
-      </p:sp>
-      <p:sp>
-        <p:nvSpPr>
-          <p:cNvPr id="22" name="Rectangle 21">
-            <a:extLst>
-              <a:ext uri="{FF2B5EF4-FFF2-40B4-BE49-F238E27FC236}">
-                <a16:creationId xmlns:a16="http://schemas.microsoft.com/office/drawing/2014/main" id="{769DC167-AA6B-409A-9AAF-269A530FDA02}"/>
-              </a:ext>
-            </a:extLst>
-          </p:cNvPr>
-          <p:cNvSpPr/>
-          <p:nvPr/>
-        </p:nvSpPr>
-        <p:spPr>
-          <a:xfrm>
-            <a:off x="7393545" y="2030837"/>
-            <a:ext cx="169057" cy="2470208"/>
-          </a:xfrm>
-          <a:prstGeom prst="rect">
-            <a:avLst/>
-          </a:prstGeom>
-          <a:solidFill>
-            <a:schemeClr val="bg2"/>
-          </a:solidFill>
-          <a:ln>
-            <a:solidFill>
-              <a:schemeClr val="tx1"/>
-            </a:solidFill>
-          </a:ln>
-        </p:spPr>
-        <p:style>
-          <a:lnRef idx="2">
-            <a:schemeClr val="accent1">
-              <a:shade val="50000"/>
-            </a:schemeClr>
-          </a:lnRef>
-          <a:fillRef idx="1">
-            <a:schemeClr val="accent1"/>
-          </a:fillRef>
-          <a:effectRef idx="0">
-            <a:schemeClr val="accent1"/>
-          </a:effectRef>
-          <a:fontRef idx="minor">
-            <a:schemeClr val="lt1"/>
-          </a:fontRef>
-        </p:style>
-        <p:txBody>
-          <a:bodyPr rtlCol="0" anchor="ctr"/>
-          <a:lstStyle/>
-          <a:p>
-            <a:pPr algn="ctr"/>
-            <a:endParaRPr lang="en-US"/>
-          </a:p>
-        </p:txBody>
-      </p:sp>
-      <p:sp>
-        <p:nvSpPr>
-          <p:cNvPr id="23" name="TextBox 22">
-            <a:extLst>
-              <a:ext uri="{FF2B5EF4-FFF2-40B4-BE49-F238E27FC236}">
-                <a16:creationId xmlns:a16="http://schemas.microsoft.com/office/drawing/2014/main" id="{A6A25776-FBD0-435F-BA0D-F7BEEC3A4013}"/>
-              </a:ext>
-            </a:extLst>
-          </p:cNvPr>
-          <p:cNvSpPr txBox="1"/>
-          <p:nvPr/>
-        </p:nvSpPr>
-        <p:spPr>
-          <a:xfrm>
-            <a:off x="9612137" y="762789"/>
-            <a:ext cx="1258678" cy="307777"/>
-          </a:xfrm>
-          <a:prstGeom prst="rect">
-            <a:avLst/>
-          </a:prstGeom>
-          <a:noFill/>
-        </p:spPr>
-        <p:txBody>
-          <a:bodyPr wrap="none" rtlCol="0">
-            <a:spAutoFit/>
-          </a:bodyPr>
-          <a:lstStyle/>
-          <a:p>
-            <a:r>
-              <a:rPr lang="en-US" sz="1400" u="sng" dirty="0" err="1">
-                <a:latin typeface="Georgia" panose="02040502050405020303" pitchFamily="18" charset="0"/>
-              </a:rPr>
-              <a:t>CustomerList</a:t>
-            </a:r>
-            <a:endParaRPr lang="en-US" sz="1400" u="sng" dirty="0">
-              <a:latin typeface="Georgia" panose="02040502050405020303" pitchFamily="18" charset="0"/>
-            </a:endParaRPr>
-          </a:p>
-        </p:txBody>
-      </p:sp>
-      <p:sp>
-        <p:nvSpPr>
-          <p:cNvPr id="24" name="Rectangle 23">
-            <a:extLst>
-              <a:ext uri="{FF2B5EF4-FFF2-40B4-BE49-F238E27FC236}">
-                <a16:creationId xmlns:a16="http://schemas.microsoft.com/office/drawing/2014/main" id="{5090F218-6A7D-41BE-9401-6E5F23793C90}"/>
-              </a:ext>
-            </a:extLst>
-          </p:cNvPr>
-          <p:cNvSpPr/>
-          <p:nvPr/>
-        </p:nvSpPr>
-        <p:spPr>
-          <a:xfrm>
-            <a:off x="10190671" y="2869039"/>
-            <a:ext cx="169058" cy="2160059"/>
-          </a:xfrm>
-          <a:prstGeom prst="rect">
-            <a:avLst/>
-          </a:prstGeom>
-          <a:solidFill>
-            <a:schemeClr val="bg2"/>
-          </a:solidFill>
-          <a:ln>
-            <a:solidFill>
-              <a:schemeClr val="tx1"/>
-            </a:solidFill>
-          </a:ln>
-        </p:spPr>
-        <p:style>
-          <a:lnRef idx="2">
-            <a:schemeClr val="accent1">
-              <a:shade val="50000"/>
-            </a:schemeClr>
-          </a:lnRef>
-          <a:fillRef idx="1">
-            <a:schemeClr val="accent1"/>
-          </a:fillRef>
-          <a:effectRef idx="0">
-            <a:schemeClr val="accent1"/>
-          </a:effectRef>
-          <a:fontRef idx="minor">
-            <a:schemeClr val="lt1"/>
-          </a:fontRef>
-        </p:style>
-        <p:txBody>
-          <a:bodyPr rtlCol="0" anchor="ctr"/>
-          <a:lstStyle/>
-          <a:p>
-            <a:pPr algn="ctr"/>
-            <a:endParaRPr lang="en-US"/>
-          </a:p>
-        </p:txBody>
-      </p:sp>
-      <p:cxnSp>
-        <p:nvCxnSpPr>
-          <p:cNvPr id="25" name="Straight Connector 24">
-            <a:extLst>
-              <a:ext uri="{FF2B5EF4-FFF2-40B4-BE49-F238E27FC236}">
-                <a16:creationId xmlns:a16="http://schemas.microsoft.com/office/drawing/2014/main" id="{FAE76E5D-6C63-4C1C-9724-2570B479D5CE}"/>
-              </a:ext>
-            </a:extLst>
-          </p:cNvPr>
-          <p:cNvCxnSpPr>
-            <a:cxnSpLocks/>
-          </p:cNvCxnSpPr>
-          <p:nvPr/>
-        </p:nvCxnSpPr>
-        <p:spPr>
-          <a:xfrm>
-            <a:off x="7462652" y="1214741"/>
-            <a:ext cx="0" cy="816096"/>
-          </a:xfrm>
-          <a:prstGeom prst="line">
-            <a:avLst/>
-          </a:prstGeom>
-          <a:ln w="9525" cap="flat" cmpd="sng" algn="ctr">
-            <a:solidFill>
-              <a:schemeClr val="dk1"/>
-            </a:solidFill>
-            <a:prstDash val="dash"/>
-            <a:round/>
-            <a:headEnd type="none" w="med" len="med"/>
-            <a:tailEnd type="none" w="med" len="med"/>
-          </a:ln>
-        </p:spPr>
-        <p:style>
-          <a:lnRef idx="0">
-            <a:scrgbClr r="0" g="0" b="0"/>
-          </a:lnRef>
-          <a:fillRef idx="0">
-            <a:scrgbClr r="0" g="0" b="0"/>
-          </a:fillRef>
-          <a:effectRef idx="0">
-            <a:scrgbClr r="0" g="0" b="0"/>
-          </a:effectRef>
-          <a:fontRef idx="minor">
-            <a:schemeClr val="tx1"/>
-          </a:fontRef>
-        </p:style>
-      </p:cxnSp>
-      <p:cxnSp>
-        <p:nvCxnSpPr>
-          <p:cNvPr id="26" name="Straight Connector 25">
-            <a:extLst>
-              <a:ext uri="{FF2B5EF4-FFF2-40B4-BE49-F238E27FC236}">
-                <a16:creationId xmlns:a16="http://schemas.microsoft.com/office/drawing/2014/main" id="{B81124A9-4D58-4417-BF4F-1D1A2A2E44FF}"/>
-              </a:ext>
-            </a:extLst>
-          </p:cNvPr>
-          <p:cNvCxnSpPr>
-            <a:cxnSpLocks/>
-          </p:cNvCxnSpPr>
-          <p:nvPr/>
-        </p:nvCxnSpPr>
-        <p:spPr>
-          <a:xfrm>
-            <a:off x="7495451" y="4542501"/>
-            <a:ext cx="45175" cy="1827308"/>
-          </a:xfrm>
-          <a:prstGeom prst="line">
-            <a:avLst/>
-          </a:prstGeom>
-          <a:ln w="9525" cap="flat" cmpd="sng" algn="ctr">
-            <a:solidFill>
-              <a:schemeClr val="dk1"/>
-            </a:solidFill>
-            <a:prstDash val="dash"/>
-            <a:round/>
-            <a:headEnd type="none" w="med" len="med"/>
-            <a:tailEnd type="none" w="med" len="med"/>
-          </a:ln>
-        </p:spPr>
-        <p:style>
-          <a:lnRef idx="0">
-            <a:scrgbClr r="0" g="0" b="0"/>
-          </a:lnRef>
-          <a:fillRef idx="0">
-            <a:scrgbClr r="0" g="0" b="0"/>
-          </a:fillRef>
-          <a:effectRef idx="0">
-            <a:scrgbClr r="0" g="0" b="0"/>
-          </a:effectRef>
-          <a:fontRef idx="minor">
-            <a:schemeClr val="tx1"/>
-          </a:fontRef>
-        </p:style>
-      </p:cxnSp>
-      <p:cxnSp>
-        <p:nvCxnSpPr>
-          <p:cNvPr id="27" name="Straight Connector 26">
-            <a:extLst>
-              <a:ext uri="{FF2B5EF4-FFF2-40B4-BE49-F238E27FC236}">
-                <a16:creationId xmlns:a16="http://schemas.microsoft.com/office/drawing/2014/main" id="{969FB2FF-FA42-4C20-8466-B2BA1E996FFF}"/>
-              </a:ext>
-            </a:extLst>
-          </p:cNvPr>
-          <p:cNvCxnSpPr>
-            <a:cxnSpLocks/>
-            <a:endCxn id="24" idx="0"/>
-          </p:cNvCxnSpPr>
-          <p:nvPr/>
-        </p:nvCxnSpPr>
-        <p:spPr>
-          <a:xfrm flipH="1">
-            <a:off x="10275200" y="1114021"/>
-            <a:ext cx="2" cy="1755018"/>
-          </a:xfrm>
-          <a:prstGeom prst="line">
-            <a:avLst/>
-          </a:prstGeom>
-          <a:ln w="9525" cap="flat" cmpd="sng" algn="ctr">
-            <a:solidFill>
-              <a:schemeClr val="dk1"/>
-            </a:solidFill>
-            <a:prstDash val="dash"/>
-            <a:round/>
-            <a:headEnd type="none" w="med" len="med"/>
-            <a:tailEnd type="none" w="med" len="med"/>
-          </a:ln>
-        </p:spPr>
-        <p:style>
-          <a:lnRef idx="0">
-            <a:scrgbClr r="0" g="0" b="0"/>
-          </a:lnRef>
-          <a:fillRef idx="0">
-            <a:scrgbClr r="0" g="0" b="0"/>
-          </a:fillRef>
-          <a:effectRef idx="0">
-            <a:scrgbClr r="0" g="0" b="0"/>
-          </a:effectRef>
-          <a:fontRef idx="minor">
-            <a:schemeClr val="tx1"/>
-          </a:fontRef>
-        </p:style>
-      </p:cxnSp>
-      <p:cxnSp>
-        <p:nvCxnSpPr>
-          <p:cNvPr id="28" name="Straight Connector 27">
-            <a:extLst>
-              <a:ext uri="{FF2B5EF4-FFF2-40B4-BE49-F238E27FC236}">
-                <a16:creationId xmlns:a16="http://schemas.microsoft.com/office/drawing/2014/main" id="{8F7B3924-8ADE-4E24-8F52-EF9F171CA264}"/>
-              </a:ext>
-            </a:extLst>
-          </p:cNvPr>
-          <p:cNvCxnSpPr>
-            <a:cxnSpLocks/>
-            <a:stCxn id="24" idx="2"/>
-          </p:cNvCxnSpPr>
-          <p:nvPr/>
-        </p:nvCxnSpPr>
-        <p:spPr>
-          <a:xfrm>
-            <a:off x="10275200" y="5029098"/>
-            <a:ext cx="0" cy="1292874"/>
-          </a:xfrm>
-          <a:prstGeom prst="line">
-            <a:avLst/>
-          </a:prstGeom>
-          <a:ln w="9525" cap="flat" cmpd="sng" algn="ctr">
-            <a:solidFill>
-              <a:schemeClr val="dk1"/>
-            </a:solidFill>
-            <a:prstDash val="dash"/>
-            <a:round/>
-            <a:headEnd type="none" w="med" len="med"/>
-            <a:tailEnd type="none" w="med" len="med"/>
-          </a:ln>
-        </p:spPr>
-        <p:style>
-          <a:lnRef idx="0">
-            <a:scrgbClr r="0" g="0" b="0"/>
-          </a:lnRef>
-          <a:fillRef idx="0">
-            <a:scrgbClr r="0" g="0" b="0"/>
-          </a:fillRef>
-          <a:effectRef idx="0">
-            <a:scrgbClr r="0" g="0" b="0"/>
-          </a:effectRef>
-          <a:fontRef idx="minor">
-            <a:schemeClr val="tx1"/>
-          </a:fontRef>
-        </p:style>
-      </p:cxnSp>
-      <p:sp>
-        <p:nvSpPr>
-          <p:cNvPr id="40" name="TextBox 39">
-            <a:extLst>
-              <a:ext uri="{FF2B5EF4-FFF2-40B4-BE49-F238E27FC236}">
-                <a16:creationId xmlns:a16="http://schemas.microsoft.com/office/drawing/2014/main" id="{E756C5C5-2CCA-4C2F-ADF1-5F88000B3F91}"/>
-              </a:ext>
-            </a:extLst>
-          </p:cNvPr>
-          <p:cNvSpPr txBox="1"/>
-          <p:nvPr/>
-        </p:nvSpPr>
-        <p:spPr>
-          <a:xfrm>
-            <a:off x="6983995" y="845660"/>
-            <a:ext cx="957313" cy="307777"/>
-          </a:xfrm>
-          <a:prstGeom prst="rect">
-            <a:avLst/>
-          </a:prstGeom>
-          <a:noFill/>
-        </p:spPr>
-        <p:txBody>
-          <a:bodyPr wrap="none" rtlCol="0">
-            <a:spAutoFit/>
-          </a:bodyPr>
-          <a:lstStyle/>
-          <a:p>
-            <a:r>
-              <a:rPr lang="en-US" sz="1400" u="sng" dirty="0">
-                <a:latin typeface="Georgia" panose="02040502050405020303" pitchFamily="18" charset="0"/>
-              </a:rPr>
-              <a:t>Customer</a:t>
-            </a:r>
-          </a:p>
-        </p:txBody>
-      </p:sp>
-      <p:cxnSp>
-        <p:nvCxnSpPr>
-          <p:cNvPr id="43" name="Straight Connector 42">
-            <a:extLst>
-              <a:ext uri="{FF2B5EF4-FFF2-40B4-BE49-F238E27FC236}">
-                <a16:creationId xmlns:a16="http://schemas.microsoft.com/office/drawing/2014/main" id="{045ACB1A-D336-4433-8197-36942DDA8816}"/>
-              </a:ext>
-            </a:extLst>
-          </p:cNvPr>
-          <p:cNvCxnSpPr>
-            <a:cxnSpLocks/>
-          </p:cNvCxnSpPr>
-          <p:nvPr/>
-        </p:nvCxnSpPr>
-        <p:spPr>
-          <a:xfrm>
-            <a:off x="4629396" y="1043153"/>
-            <a:ext cx="0" cy="240527"/>
-          </a:xfrm>
-          <a:prstGeom prst="line">
-            <a:avLst/>
-          </a:prstGeom>
-          <a:ln w="9525" cap="flat" cmpd="sng" algn="ctr">
-            <a:solidFill>
-              <a:schemeClr val="dk1"/>
-            </a:solidFill>
-            <a:prstDash val="dash"/>
-            <a:round/>
-            <a:headEnd type="none" w="med" len="med"/>
-            <a:tailEnd type="none" w="med" len="med"/>
-          </a:ln>
-        </p:spPr>
-        <p:style>
-          <a:lnRef idx="0">
-            <a:scrgbClr r="0" g="0" b="0"/>
-          </a:lnRef>
-          <a:fillRef idx="0">
-            <a:scrgbClr r="0" g="0" b="0"/>
-          </a:fillRef>
-          <a:effectRef idx="0">
-            <a:scrgbClr r="0" g="0" b="0"/>
-          </a:effectRef>
-          <a:fontRef idx="minor">
-            <a:schemeClr val="tx1"/>
-          </a:fontRef>
-        </p:style>
-      </p:cxnSp>
-      <p:sp>
-        <p:nvSpPr>
-          <p:cNvPr id="46" name="TextBox 45">
-            <a:extLst>
-              <a:ext uri="{FF2B5EF4-FFF2-40B4-BE49-F238E27FC236}">
-                <a16:creationId xmlns:a16="http://schemas.microsoft.com/office/drawing/2014/main" id="{C8E3622D-B120-462A-A74E-93D1A1FF6AAC}"/>
-              </a:ext>
-            </a:extLst>
-          </p:cNvPr>
-          <p:cNvSpPr txBox="1"/>
-          <p:nvPr/>
-        </p:nvSpPr>
-        <p:spPr>
-          <a:xfrm>
-            <a:off x="2137282" y="2344073"/>
-            <a:ext cx="2249334" cy="276999"/>
-          </a:xfrm>
-          <a:prstGeom prst="rect">
-            <a:avLst/>
-          </a:prstGeom>
-          <a:noFill/>
-        </p:spPr>
-        <p:txBody>
-          <a:bodyPr wrap="none" rtlCol="0">
-            <a:spAutoFit/>
-          </a:bodyPr>
-          <a:lstStyle/>
-          <a:p>
-            <a:r>
-              <a:rPr lang="en-US" sz="1200" dirty="0" err="1">
-                <a:latin typeface="Georgia" panose="02040502050405020303" pitchFamily="18" charset="0"/>
-              </a:rPr>
-              <a:t>removeCustomer</a:t>
-            </a:r>
-            <a:r>
-              <a:rPr lang="en-US" sz="1200" dirty="0">
-                <a:latin typeface="Georgia" panose="02040502050405020303" pitchFamily="18" charset="0"/>
-              </a:rPr>
-              <a:t>(</a:t>
-            </a:r>
-            <a:r>
-              <a:rPr lang="en-US" sz="1200" dirty="0" err="1">
-                <a:latin typeface="Georgia" panose="02040502050405020303" pitchFamily="18" charset="0"/>
-              </a:rPr>
-              <a:t>customerId</a:t>
-            </a:r>
-            <a:r>
-              <a:rPr lang="en-US" sz="1200" dirty="0">
-                <a:latin typeface="Georgia" panose="02040502050405020303" pitchFamily="18" charset="0"/>
-              </a:rPr>
-              <a:t>)</a:t>
-            </a:r>
-          </a:p>
-        </p:txBody>
-      </p:sp>
-      <p:cxnSp>
-        <p:nvCxnSpPr>
-          <p:cNvPr id="47" name="Straight Arrow Connector 46">
-            <a:extLst>
-              <a:ext uri="{FF2B5EF4-FFF2-40B4-BE49-F238E27FC236}">
-                <a16:creationId xmlns:a16="http://schemas.microsoft.com/office/drawing/2014/main" id="{11EB37F8-D52F-4BBF-941A-3BE8A4825B06}"/>
-              </a:ext>
-            </a:extLst>
-          </p:cNvPr>
-          <p:cNvCxnSpPr>
-            <a:cxnSpLocks/>
-          </p:cNvCxnSpPr>
-          <p:nvPr/>
-        </p:nvCxnSpPr>
-        <p:spPr>
-          <a:xfrm>
-            <a:off x="2170386" y="2649439"/>
-            <a:ext cx="2324029" cy="0"/>
-          </a:xfrm>
-          <a:prstGeom prst="straightConnector1">
-            <a:avLst/>
-          </a:prstGeom>
-          <a:ln>
-            <a:headEnd type="none" w="med" len="med"/>
-            <a:tailEnd type="arrow" w="med" len="med"/>
-          </a:ln>
-        </p:spPr>
-        <p:style>
-          <a:lnRef idx="3">
-            <a:schemeClr val="dk1"/>
-          </a:lnRef>
-          <a:fillRef idx="0">
-            <a:schemeClr val="dk1"/>
-          </a:fillRef>
-          <a:effectRef idx="2">
-            <a:schemeClr val="dk1"/>
-          </a:effectRef>
-          <a:fontRef idx="minor">
-            <a:schemeClr val="tx1"/>
-          </a:fontRef>
-        </p:style>
-      </p:cxnSp>
+      <p:pic>
+        <p:nvPicPr>
+          <p:cNvPr id="15" name="Picture 14">
+            <a:extLst>
+              <a:ext uri="{FF2B5EF4-FFF2-40B4-BE49-F238E27FC236}">
+                <a16:creationId xmlns:a16="http://schemas.microsoft.com/office/drawing/2014/main" id="{39EC8BD1-614C-4167-8E0A-44DA16066FB8}"/>
+              </a:ext>
+            </a:extLst>
+          </p:cNvPr>
+          <p:cNvPicPr>
+            <a:picLocks noChangeAspect="1"/>
+          </p:cNvPicPr>
+          <p:nvPr/>
+        </p:nvPicPr>
+        <p:blipFill>
+          <a:blip r:embed="rId4">
+            <a:extLst>
+              <a:ext uri="{28A0092B-C50C-407E-A947-70E740481C1C}">
+                <a14:useLocalDpi xmlns:a14="http://schemas.microsoft.com/office/drawing/2010/main" val="0"/>
+              </a:ext>
+            </a:extLst>
+          </a:blip>
+          <a:stretch>
+            <a:fillRect/>
+          </a:stretch>
+        </p:blipFill>
+        <p:spPr>
+          <a:xfrm>
+            <a:off x="2233387" y="1685636"/>
+            <a:ext cx="8093987" cy="4395872"/>
+          </a:xfrm>
+          <a:prstGeom prst="rect">
+            <a:avLst/>
+          </a:prstGeom>
+        </p:spPr>
+      </p:pic>
     </p:spTree>
     <p:extLst>
       <p:ext uri="{BB962C8B-B14F-4D97-AF65-F5344CB8AC3E}">
@@ -12915,97 +11916,6 @@
           </a:fontRef>
         </p:style>
       </p:cxnSp>
-      <p:sp>
-        <p:nvSpPr>
-          <p:cNvPr id="16" name="Rectangle 15">
-            <a:extLst>
-              <a:ext uri="{FF2B5EF4-FFF2-40B4-BE49-F238E27FC236}">
-                <a16:creationId xmlns:a16="http://schemas.microsoft.com/office/drawing/2014/main" id="{0285C4BD-12F1-4D93-81B0-4B81C5DE0ACF}"/>
-              </a:ext>
-            </a:extLst>
-          </p:cNvPr>
-          <p:cNvSpPr/>
-          <p:nvPr/>
-        </p:nvSpPr>
-        <p:spPr>
-          <a:xfrm>
-            <a:off x="3841085" y="1114021"/>
-            <a:ext cx="169057" cy="4391855"/>
-          </a:xfrm>
-          <a:prstGeom prst="rect">
-            <a:avLst/>
-          </a:prstGeom>
-          <a:solidFill>
-            <a:schemeClr val="bg2"/>
-          </a:solidFill>
-          <a:ln>
-            <a:solidFill>
-              <a:schemeClr val="tx1"/>
-            </a:solidFill>
-          </a:ln>
-        </p:spPr>
-        <p:style>
-          <a:lnRef idx="2">
-            <a:schemeClr val="accent1">
-              <a:shade val="50000"/>
-            </a:schemeClr>
-          </a:lnRef>
-          <a:fillRef idx="1">
-            <a:schemeClr val="accent1"/>
-          </a:fillRef>
-          <a:effectRef idx="0">
-            <a:schemeClr val="accent1"/>
-          </a:effectRef>
-          <a:fontRef idx="minor">
-            <a:schemeClr val="lt1"/>
-          </a:fontRef>
-        </p:style>
-        <p:txBody>
-          <a:bodyPr rtlCol="0" anchor="ctr"/>
-          <a:lstStyle/>
-          <a:p>
-            <a:pPr algn="ctr"/>
-            <a:endParaRPr lang="en-US"/>
-          </a:p>
-        </p:txBody>
-      </p:sp>
-      <p:sp>
-        <p:nvSpPr>
-          <p:cNvPr id="17" name="TextBox 16">
-            <a:extLst>
-              <a:ext uri="{FF2B5EF4-FFF2-40B4-BE49-F238E27FC236}">
-                <a16:creationId xmlns:a16="http://schemas.microsoft.com/office/drawing/2014/main" id="{5F14A1DD-3841-44CD-81BB-FC50BB190866}"/>
-              </a:ext>
-            </a:extLst>
-          </p:cNvPr>
-          <p:cNvSpPr txBox="1"/>
-          <p:nvPr/>
-        </p:nvSpPr>
-        <p:spPr>
-          <a:xfrm>
-            <a:off x="3536369" y="780958"/>
-            <a:ext cx="798617" cy="307777"/>
-          </a:xfrm>
-          <a:prstGeom prst="rect">
-            <a:avLst/>
-          </a:prstGeom>
-          <a:noFill/>
-        </p:spPr>
-        <p:txBody>
-          <a:bodyPr wrap="none" rtlCol="0">
-            <a:spAutoFit/>
-          </a:bodyPr>
-          <a:lstStyle/>
-          <a:p>
-            <a:r>
-              <a:rPr lang="en-US" sz="1400" u="sng" dirty="0">
-                <a:latin typeface="Georgia" panose="02040502050405020303" pitchFamily="18" charset="0"/>
-              </a:rPr>
-              <a:t>Theater</a:t>
-            </a:r>
-          </a:p>
-        </p:txBody>
-      </p:sp>
       <p:cxnSp>
         <p:nvCxnSpPr>
           <p:cNvPr id="19" name="Straight Connector 18">

</xml_diff>

<commit_message>
Sequence Diagram: List Tickets
</commit_message>
<xml_diff>
--- a/Diagrams and Charts/Sequence Charts.pptx
+++ b/Diagrams and Charts/Sequence Charts.pptx
@@ -19,6 +19,8 @@
     <p:sldId id="267" r:id="rId13"/>
     <p:sldId id="268" r:id="rId14"/>
     <p:sldId id="269" r:id="rId15"/>
+    <p:sldId id="272" r:id="rId16"/>
+    <p:sldId id="273" r:id="rId17"/>
   </p:sldIdLst>
   <p:sldSz cx="12192000" cy="6858000"/>
   <p:notesSz cx="6858000" cy="9144000"/>
@@ -272,7 +274,7 @@
           <a:p>
             <a:fld id="{1C1F3817-498B-459A-928B-153134D14AF2}" type="datetimeFigureOut">
               <a:rPr lang="en-US" smtClean="0"/>
-              <a:t>2/27/2018</a:t>
+              <a:t>3/21/2018</a:t>
             </a:fld>
             <a:endParaRPr lang="en-US"/>
           </a:p>
@@ -470,7 +472,7 @@
           <a:p>
             <a:fld id="{1C1F3817-498B-459A-928B-153134D14AF2}" type="datetimeFigureOut">
               <a:rPr lang="en-US" smtClean="0"/>
-              <a:t>2/27/2018</a:t>
+              <a:t>3/21/2018</a:t>
             </a:fld>
             <a:endParaRPr lang="en-US"/>
           </a:p>
@@ -678,7 +680,7 @@
           <a:p>
             <a:fld id="{1C1F3817-498B-459A-928B-153134D14AF2}" type="datetimeFigureOut">
               <a:rPr lang="en-US" smtClean="0"/>
-              <a:t>2/27/2018</a:t>
+              <a:t>3/21/2018</a:t>
             </a:fld>
             <a:endParaRPr lang="en-US"/>
           </a:p>
@@ -876,7 +878,7 @@
           <a:p>
             <a:fld id="{1C1F3817-498B-459A-928B-153134D14AF2}" type="datetimeFigureOut">
               <a:rPr lang="en-US" smtClean="0"/>
-              <a:t>2/27/2018</a:t>
+              <a:t>3/21/2018</a:t>
             </a:fld>
             <a:endParaRPr lang="en-US"/>
           </a:p>
@@ -1151,7 +1153,7 @@
           <a:p>
             <a:fld id="{1C1F3817-498B-459A-928B-153134D14AF2}" type="datetimeFigureOut">
               <a:rPr lang="en-US" smtClean="0"/>
-              <a:t>2/27/2018</a:t>
+              <a:t>3/21/2018</a:t>
             </a:fld>
             <a:endParaRPr lang="en-US"/>
           </a:p>
@@ -1416,7 +1418,7 @@
           <a:p>
             <a:fld id="{1C1F3817-498B-459A-928B-153134D14AF2}" type="datetimeFigureOut">
               <a:rPr lang="en-US" smtClean="0"/>
-              <a:t>2/27/2018</a:t>
+              <a:t>3/21/2018</a:t>
             </a:fld>
             <a:endParaRPr lang="en-US"/>
           </a:p>
@@ -1828,7 +1830,7 @@
           <a:p>
             <a:fld id="{1C1F3817-498B-459A-928B-153134D14AF2}" type="datetimeFigureOut">
               <a:rPr lang="en-US" smtClean="0"/>
-              <a:t>2/27/2018</a:t>
+              <a:t>3/21/2018</a:t>
             </a:fld>
             <a:endParaRPr lang="en-US"/>
           </a:p>
@@ -1969,7 +1971,7 @@
           <a:p>
             <a:fld id="{1C1F3817-498B-459A-928B-153134D14AF2}" type="datetimeFigureOut">
               <a:rPr lang="en-US" smtClean="0"/>
-              <a:t>2/27/2018</a:t>
+              <a:t>3/21/2018</a:t>
             </a:fld>
             <a:endParaRPr lang="en-US"/>
           </a:p>
@@ -2082,7 +2084,7 @@
           <a:p>
             <a:fld id="{1C1F3817-498B-459A-928B-153134D14AF2}" type="datetimeFigureOut">
               <a:rPr lang="en-US" smtClean="0"/>
-              <a:t>2/27/2018</a:t>
+              <a:t>3/21/2018</a:t>
             </a:fld>
             <a:endParaRPr lang="en-US"/>
           </a:p>
@@ -2393,7 +2395,7 @@
           <a:p>
             <a:fld id="{1C1F3817-498B-459A-928B-153134D14AF2}" type="datetimeFigureOut">
               <a:rPr lang="en-US" smtClean="0"/>
-              <a:t>2/27/2018</a:t>
+              <a:t>3/21/2018</a:t>
             </a:fld>
             <a:endParaRPr lang="en-US"/>
           </a:p>
@@ -2681,7 +2683,7 @@
           <a:p>
             <a:fld id="{1C1F3817-498B-459A-928B-153134D14AF2}" type="datetimeFigureOut">
               <a:rPr lang="en-US" smtClean="0"/>
-              <a:t>2/27/2018</a:t>
+              <a:t>3/21/2018</a:t>
             </a:fld>
             <a:endParaRPr lang="en-US"/>
           </a:p>
@@ -2922,7 +2924,7 @@
           <a:p>
             <a:fld id="{1C1F3817-498B-459A-928B-153134D14AF2}" type="datetimeFigureOut">
               <a:rPr lang="en-US" smtClean="0"/>
-              <a:t>2/27/2018</a:t>
+              <a:t>3/21/2018</a:t>
             </a:fld>
             <a:endParaRPr lang="en-US"/>
           </a:p>
@@ -4731,6 +4733,277 @@
 </p:sld>
 </file>
 
+<file path=ppt/slides/slide15.xml><?xml version="1.0" encoding="utf-8"?>
+<p:sld xmlns:a="http://schemas.openxmlformats.org/drawingml/2006/main" xmlns:r="http://schemas.openxmlformats.org/officeDocument/2006/relationships" xmlns:p="http://schemas.openxmlformats.org/presentationml/2006/main">
+  <p:cSld>
+    <p:spTree>
+      <p:nvGrpSpPr>
+        <p:cNvPr id="1" name=""/>
+        <p:cNvGrpSpPr/>
+        <p:nvPr/>
+      </p:nvGrpSpPr>
+      <p:grpSpPr>
+        <a:xfrm>
+          <a:off x="0" y="0"/>
+          <a:ext cx="0" cy="0"/>
+          <a:chOff x="0" y="0"/>
+          <a:chExt cx="0" cy="0"/>
+        </a:xfrm>
+      </p:grpSpPr>
+      <p:sp>
+        <p:nvSpPr>
+          <p:cNvPr id="2" name="Title 1">
+            <a:extLst>
+              <a:ext uri="{FF2B5EF4-FFF2-40B4-BE49-F238E27FC236}">
+                <a16:creationId xmlns:a16="http://schemas.microsoft.com/office/drawing/2014/main" id="{848D51BA-3476-422A-9E15-7E65C86D0431}"/>
+              </a:ext>
+            </a:extLst>
+          </p:cNvPr>
+          <p:cNvSpPr>
+            <a:spLocks noGrp="1"/>
+          </p:cNvSpPr>
+          <p:nvPr>
+            <p:ph type="title"/>
+          </p:nvPr>
+        </p:nvSpPr>
+        <p:spPr/>
+        <p:txBody>
+          <a:bodyPr/>
+          <a:lstStyle/>
+          <a:p>
+            <a:endParaRPr lang="en-US"/>
+          </a:p>
+        </p:txBody>
+      </p:sp>
+      <p:sp>
+        <p:nvSpPr>
+          <p:cNvPr id="3" name="Content Placeholder 2">
+            <a:extLst>
+              <a:ext uri="{FF2B5EF4-FFF2-40B4-BE49-F238E27FC236}">
+                <a16:creationId xmlns:a16="http://schemas.microsoft.com/office/drawing/2014/main" id="{E8240F65-1FB4-47E7-8FAE-737EE0F81C1F}"/>
+              </a:ext>
+            </a:extLst>
+          </p:cNvPr>
+          <p:cNvSpPr>
+            <a:spLocks noGrp="1"/>
+          </p:cNvSpPr>
+          <p:nvPr>
+            <p:ph idx="1"/>
+          </p:nvPr>
+        </p:nvSpPr>
+        <p:spPr/>
+        <p:txBody>
+          <a:bodyPr/>
+          <a:lstStyle/>
+          <a:p>
+            <a:endParaRPr lang="en-US"/>
+          </a:p>
+        </p:txBody>
+      </p:sp>
+    </p:spTree>
+    <p:extLst>
+      <p:ext uri="{BB962C8B-B14F-4D97-AF65-F5344CB8AC3E}">
+        <p14:creationId xmlns:p14="http://schemas.microsoft.com/office/powerpoint/2010/main" val="473342560"/>
+      </p:ext>
+    </p:extLst>
+  </p:cSld>
+  <p:clrMapOvr>
+    <a:masterClrMapping/>
+  </p:clrMapOvr>
+</p:sld>
+</file>
+
+<file path=ppt/slides/slide16.xml><?xml version="1.0" encoding="utf-8"?>
+<p:sld xmlns:a="http://schemas.openxmlformats.org/drawingml/2006/main" xmlns:r="http://schemas.openxmlformats.org/officeDocument/2006/relationships" xmlns:p="http://schemas.openxmlformats.org/presentationml/2006/main">
+  <p:cSld>
+    <p:spTree>
+      <p:nvGrpSpPr>
+        <p:cNvPr id="1" name=""/>
+        <p:cNvGrpSpPr/>
+        <p:nvPr/>
+      </p:nvGrpSpPr>
+      <p:grpSpPr>
+        <a:xfrm>
+          <a:off x="0" y="0"/>
+          <a:ext cx="0" cy="0"/>
+          <a:chOff x="0" y="0"/>
+          <a:chExt cx="0" cy="0"/>
+        </a:xfrm>
+      </p:grpSpPr>
+      <p:sp>
+        <p:nvSpPr>
+          <p:cNvPr id="4" name="Rectangle 3">
+            <a:extLst>
+              <a:ext uri="{FF2B5EF4-FFF2-40B4-BE49-F238E27FC236}">
+                <a16:creationId xmlns:a16="http://schemas.microsoft.com/office/drawing/2014/main" id="{5E4728A9-43B4-4413-8980-CA41E40E12A2}"/>
+              </a:ext>
+            </a:extLst>
+          </p:cNvPr>
+          <p:cNvSpPr/>
+          <p:nvPr/>
+        </p:nvSpPr>
+        <p:spPr>
+          <a:xfrm>
+            <a:off x="619666" y="1020563"/>
+            <a:ext cx="10899228" cy="5477891"/>
+          </a:xfrm>
+          <a:prstGeom prst="rect">
+            <a:avLst/>
+          </a:prstGeom>
+          <a:solidFill>
+            <a:schemeClr val="bg1"/>
+          </a:solidFill>
+        </p:spPr>
+        <p:style>
+          <a:lnRef idx="2">
+            <a:schemeClr val="accent1">
+              <a:shade val="50000"/>
+            </a:schemeClr>
+          </a:lnRef>
+          <a:fillRef idx="1">
+            <a:schemeClr val="accent1"/>
+          </a:fillRef>
+          <a:effectRef idx="0">
+            <a:schemeClr val="accent1"/>
+          </a:effectRef>
+          <a:fontRef idx="minor">
+            <a:schemeClr val="lt1"/>
+          </a:fontRef>
+        </p:style>
+        <p:txBody>
+          <a:bodyPr rtlCol="0" anchor="ctr"/>
+          <a:lstStyle/>
+          <a:p>
+            <a:pPr algn="ctr"/>
+            <a:endParaRPr lang="en-US" dirty="0"/>
+          </a:p>
+        </p:txBody>
+      </p:sp>
+      <p:sp>
+        <p:nvSpPr>
+          <p:cNvPr id="5" name="TextBox 4">
+            <a:extLst>
+              <a:ext uri="{FF2B5EF4-FFF2-40B4-BE49-F238E27FC236}">
+                <a16:creationId xmlns:a16="http://schemas.microsoft.com/office/drawing/2014/main" id="{EED46A86-C106-4596-9342-011EAB247CB0}"/>
+              </a:ext>
+            </a:extLst>
+          </p:cNvPr>
+          <p:cNvSpPr txBox="1"/>
+          <p:nvPr/>
+        </p:nvSpPr>
+        <p:spPr>
+          <a:xfrm>
+            <a:off x="4156586" y="651231"/>
+            <a:ext cx="3570208" cy="369332"/>
+          </a:xfrm>
+          <a:prstGeom prst="rect">
+            <a:avLst/>
+          </a:prstGeom>
+          <a:noFill/>
+        </p:spPr>
+        <p:txBody>
+          <a:bodyPr wrap="none" rtlCol="0">
+            <a:spAutoFit/>
+          </a:bodyPr>
+          <a:lstStyle/>
+          <a:p>
+            <a:r>
+              <a:rPr lang="en-US" b="1" dirty="0">
+                <a:latin typeface="Georgia" panose="02040502050405020303" pitchFamily="18" charset="0"/>
+              </a:rPr>
+              <a:t>List All Ticket on certain day</a:t>
+            </a:r>
+          </a:p>
+        </p:txBody>
+      </p:sp>
+      <p:pic>
+        <p:nvPicPr>
+          <p:cNvPr id="7" name="Picture 6">
+            <a:extLst>
+              <a:ext uri="{FF2B5EF4-FFF2-40B4-BE49-F238E27FC236}">
+                <a16:creationId xmlns:a16="http://schemas.microsoft.com/office/drawing/2014/main" id="{181C5139-EB33-49A3-9CA2-00B25F200C5E}"/>
+              </a:ext>
+            </a:extLst>
+          </p:cNvPr>
+          <p:cNvPicPr>
+            <a:picLocks noChangeAspect="1"/>
+          </p:cNvPicPr>
+          <p:nvPr/>
+        </p:nvPicPr>
+        <p:blipFill>
+          <a:blip r:embed="rId2">
+            <a:extLst>
+              <a:ext uri="{28A0092B-C50C-407E-A947-70E740481C1C}">
+                <a14:useLocalDpi xmlns:a14="http://schemas.microsoft.com/office/drawing/2010/main" val="0"/>
+              </a:ext>
+            </a:extLst>
+          </a:blip>
+          <a:stretch>
+            <a:fillRect/>
+          </a:stretch>
+        </p:blipFill>
+        <p:spPr>
+          <a:xfrm>
+            <a:off x="1393795" y="1199016"/>
+            <a:ext cx="9349572" cy="5201784"/>
+          </a:xfrm>
+          <a:prstGeom prst="rect">
+            <a:avLst/>
+          </a:prstGeom>
+        </p:spPr>
+      </p:pic>
+      <p:pic>
+        <p:nvPicPr>
+          <p:cNvPr id="9" name="Graphic 8" descr="User">
+            <a:extLst>
+              <a:ext uri="{FF2B5EF4-FFF2-40B4-BE49-F238E27FC236}">
+                <a16:creationId xmlns:a16="http://schemas.microsoft.com/office/drawing/2014/main" id="{8CBF6EE1-F802-4256-A0A6-A52931E0F7B8}"/>
+              </a:ext>
+            </a:extLst>
+          </p:cNvPr>
+          <p:cNvPicPr>
+            <a:picLocks noChangeAspect="1"/>
+          </p:cNvPicPr>
+          <p:nvPr/>
+        </p:nvPicPr>
+        <p:blipFill>
+          <a:blip r:embed="rId3">
+            <a:extLst>
+              <a:ext uri="{28A0092B-C50C-407E-A947-70E740481C1C}">
+                <a14:useLocalDpi xmlns:a14="http://schemas.microsoft.com/office/drawing/2010/main" val="0"/>
+              </a:ext>
+              <a:ext uri="{96DAC541-7B7A-43D3-8B79-37D633B846F1}">
+                <asvg:svgBlip xmlns:asvg="http://schemas.microsoft.com/office/drawing/2016/SVG/main" r:embed="rId4"/>
+              </a:ext>
+            </a:extLst>
+          </a:blip>
+          <a:stretch>
+            <a:fillRect/>
+          </a:stretch>
+        </p:blipFill>
+        <p:spPr>
+          <a:xfrm>
+            <a:off x="1528532" y="2911512"/>
+            <a:ext cx="1034975" cy="1034975"/>
+          </a:xfrm>
+          <a:prstGeom prst="rect">
+            <a:avLst/>
+          </a:prstGeom>
+        </p:spPr>
+      </p:pic>
+    </p:spTree>
+    <p:extLst>
+      <p:ext uri="{BB962C8B-B14F-4D97-AF65-F5344CB8AC3E}">
+        <p14:creationId xmlns:p14="http://schemas.microsoft.com/office/powerpoint/2010/main" val="3024549772"/>
+      </p:ext>
+    </p:extLst>
+  </p:cSld>
+  <p:clrMapOvr>
+    <a:masterClrMapping/>
+  </p:clrMapOvr>
+</p:sld>
+</file>
+
 <file path=ppt/slides/slide2.xml><?xml version="1.0" encoding="utf-8"?>
 <p:sld xmlns:a="http://schemas.openxmlformats.org/drawingml/2006/main" xmlns:r="http://schemas.openxmlformats.org/officeDocument/2006/relationships" xmlns:p="http://schemas.openxmlformats.org/presentationml/2006/main">
   <p:cSld>

</xml_diff>